<commit_message>
Kijavítottam a dokumentáció fájlokban a backend részben a kategória hiányát.
</commit_message>
<xml_diff>
--- a/Dokumentáció/wip.pptx
+++ b/Dokumentáció/wip.pptx
@@ -120,6 +120,11 @@
       </a:defRPr>
     </a:lvl9pPr>
   </p:defaultTextStyle>
+  <p:extLst>
+    <p:ext uri="{EFAFB233-063F-42B5-8137-9DF3F51BA10A}">
+      <p15:sldGuideLst xmlns:p15="http://schemas.microsoft.com/office/powerpoint/2012/main"/>
+    </p:ext>
+  </p:extLst>
 </p:presentation>
 </file>
 
@@ -272,7 +277,7 @@
           <a:p>
             <a:fld id="{9CCF48AF-5869-4E54-B6D4-5862E7AA77BC}" type="datetimeFigureOut">
               <a:rPr lang="hu-HU" smtClean="0"/>
-              <a:t>2024. 01. 08.</a:t>
+              <a:t>2024. 01. 09.</a:t>
             </a:fld>
             <a:endParaRPr lang="hu-HU"/>
           </a:p>
@@ -472,7 +477,7 @@
           <a:p>
             <a:fld id="{9CCF48AF-5869-4E54-B6D4-5862E7AA77BC}" type="datetimeFigureOut">
               <a:rPr lang="hu-HU" smtClean="0"/>
-              <a:t>2024. 01. 08.</a:t>
+              <a:t>2024. 01. 09.</a:t>
             </a:fld>
             <a:endParaRPr lang="hu-HU"/>
           </a:p>
@@ -682,7 +687,7 @@
           <a:p>
             <a:fld id="{9CCF48AF-5869-4E54-B6D4-5862E7AA77BC}" type="datetimeFigureOut">
               <a:rPr lang="hu-HU" smtClean="0"/>
-              <a:t>2024. 01. 08.</a:t>
+              <a:t>2024. 01. 09.</a:t>
             </a:fld>
             <a:endParaRPr lang="hu-HU"/>
           </a:p>
@@ -882,7 +887,7 @@
           <a:p>
             <a:fld id="{9CCF48AF-5869-4E54-B6D4-5862E7AA77BC}" type="datetimeFigureOut">
               <a:rPr lang="hu-HU" smtClean="0"/>
-              <a:t>2024. 01. 08.</a:t>
+              <a:t>2024. 01. 09.</a:t>
             </a:fld>
             <a:endParaRPr lang="hu-HU"/>
           </a:p>
@@ -1158,7 +1163,7 @@
           <a:p>
             <a:fld id="{9CCF48AF-5869-4E54-B6D4-5862E7AA77BC}" type="datetimeFigureOut">
               <a:rPr lang="hu-HU" smtClean="0"/>
-              <a:t>2024. 01. 08.</a:t>
+              <a:t>2024. 01. 09.</a:t>
             </a:fld>
             <a:endParaRPr lang="hu-HU"/>
           </a:p>
@@ -1426,7 +1431,7 @@
           <a:p>
             <a:fld id="{9CCF48AF-5869-4E54-B6D4-5862E7AA77BC}" type="datetimeFigureOut">
               <a:rPr lang="hu-HU" smtClean="0"/>
-              <a:t>2024. 01. 08.</a:t>
+              <a:t>2024. 01. 09.</a:t>
             </a:fld>
             <a:endParaRPr lang="hu-HU"/>
           </a:p>
@@ -1841,7 +1846,7 @@
           <a:p>
             <a:fld id="{9CCF48AF-5869-4E54-B6D4-5862E7AA77BC}" type="datetimeFigureOut">
               <a:rPr lang="hu-HU" smtClean="0"/>
-              <a:t>2024. 01. 08.</a:t>
+              <a:t>2024. 01. 09.</a:t>
             </a:fld>
             <a:endParaRPr lang="hu-HU"/>
           </a:p>
@@ -1983,7 +1988,7 @@
           <a:p>
             <a:fld id="{9CCF48AF-5869-4E54-B6D4-5862E7AA77BC}" type="datetimeFigureOut">
               <a:rPr lang="hu-HU" smtClean="0"/>
-              <a:t>2024. 01. 08.</a:t>
+              <a:t>2024. 01. 09.</a:t>
             </a:fld>
             <a:endParaRPr lang="hu-HU"/>
           </a:p>
@@ -2096,7 +2101,7 @@
           <a:p>
             <a:fld id="{9CCF48AF-5869-4E54-B6D4-5862E7AA77BC}" type="datetimeFigureOut">
               <a:rPr lang="hu-HU" smtClean="0"/>
-              <a:t>2024. 01. 08.</a:t>
+              <a:t>2024. 01. 09.</a:t>
             </a:fld>
             <a:endParaRPr lang="hu-HU"/>
           </a:p>
@@ -2409,7 +2414,7 @@
           <a:p>
             <a:fld id="{9CCF48AF-5869-4E54-B6D4-5862E7AA77BC}" type="datetimeFigureOut">
               <a:rPr lang="hu-HU" smtClean="0"/>
-              <a:t>2024. 01. 08.</a:t>
+              <a:t>2024. 01. 09.</a:t>
             </a:fld>
             <a:endParaRPr lang="hu-HU"/>
           </a:p>
@@ -2698,7 +2703,7 @@
           <a:p>
             <a:fld id="{9CCF48AF-5869-4E54-B6D4-5862E7AA77BC}" type="datetimeFigureOut">
               <a:rPr lang="hu-HU" smtClean="0"/>
-              <a:t>2024. 01. 08.</a:t>
+              <a:t>2024. 01. 09.</a:t>
             </a:fld>
             <a:endParaRPr lang="hu-HU"/>
           </a:p>
@@ -2941,7 +2946,7 @@
           <a:p>
             <a:fld id="{9CCF48AF-5869-4E54-B6D4-5862E7AA77BC}" type="datetimeFigureOut">
               <a:rPr lang="hu-HU" smtClean="0"/>
-              <a:t>2024. 01. 08.</a:t>
+              <a:t>2024. 01. 09.</a:t>
             </a:fld>
             <a:endParaRPr lang="hu-HU"/>
           </a:p>
@@ -4421,36 +4426,6 @@
           <a:chExt cx="0" cy="0"/>
         </a:xfrm>
       </p:grpSpPr>
-      <p:pic>
-        <p:nvPicPr>
-          <p:cNvPr id="3" name="Picture 2">
-            <a:extLst>
-              <a:ext uri="{FF2B5EF4-FFF2-40B4-BE49-F238E27FC236}">
-                <a16:creationId xmlns:a16="http://schemas.microsoft.com/office/drawing/2014/main" id="{33759214-387D-A060-74B0-EB68514A4F28}"/>
-              </a:ext>
-            </a:extLst>
-          </p:cNvPr>
-          <p:cNvPicPr>
-            <a:picLocks noChangeAspect="1"/>
-          </p:cNvPicPr>
-          <p:nvPr/>
-        </p:nvPicPr>
-        <p:blipFill>
-          <a:blip r:embed="rId2"/>
-          <a:stretch>
-            <a:fillRect/>
-          </a:stretch>
-        </p:blipFill>
-        <p:spPr>
-          <a:xfrm>
-            <a:off x="324853" y="294970"/>
-            <a:ext cx="6206132" cy="6105830"/>
-          </a:xfrm>
-          <a:prstGeom prst="rect">
-            <a:avLst/>
-          </a:prstGeom>
-        </p:spPr>
-      </p:pic>
       <p:sp>
         <p:nvSpPr>
           <p:cNvPr id="5" name="TextBox 4">
@@ -4487,6 +4462,42 @@
           </a:p>
         </p:txBody>
       </p:sp>
+      <p:pic>
+        <p:nvPicPr>
+          <p:cNvPr id="4" name="Kép 3">
+            <a:extLst>
+              <a:ext uri="{FF2B5EF4-FFF2-40B4-BE49-F238E27FC236}">
+                <a16:creationId xmlns:a16="http://schemas.microsoft.com/office/drawing/2014/main" id="{B5FBB0B6-0829-68A5-9070-C8B273E07CAE}"/>
+              </a:ext>
+            </a:extLst>
+          </p:cNvPr>
+          <p:cNvPicPr>
+            <a:picLocks noChangeAspect="1"/>
+          </p:cNvPicPr>
+          <p:nvPr/>
+        </p:nvPicPr>
+        <p:blipFill>
+          <a:blip r:embed="rId2">
+            <a:extLst>
+              <a:ext uri="{28A0092B-C50C-407E-A947-70E740481C1C}">
+                <a14:useLocalDpi xmlns:a14="http://schemas.microsoft.com/office/drawing/2010/main" val="0"/>
+              </a:ext>
+            </a:extLst>
+          </a:blip>
+          <a:stretch>
+            <a:fillRect/>
+          </a:stretch>
+        </p:blipFill>
+        <p:spPr>
+          <a:xfrm>
+            <a:off x="452284" y="282680"/>
+            <a:ext cx="5645156" cy="6226275"/>
+          </a:xfrm>
+          <a:prstGeom prst="rect">
+            <a:avLst/>
+          </a:prstGeom>
+        </p:spPr>
+      </p:pic>
     </p:spTree>
     <p:extLst>
       <p:ext uri="{BB962C8B-B14F-4D97-AF65-F5344CB8AC3E}">
@@ -4517,66 +4528,6 @@
           <a:chExt cx="0" cy="0"/>
         </a:xfrm>
       </p:grpSpPr>
-      <p:pic>
-        <p:nvPicPr>
-          <p:cNvPr id="2050" name="Picture 2">
-            <a:extLst>
-              <a:ext uri="{FF2B5EF4-FFF2-40B4-BE49-F238E27FC236}">
-                <a16:creationId xmlns:a16="http://schemas.microsoft.com/office/drawing/2014/main" id="{EE9373CD-F299-88B5-6B9D-D8630471E36D}"/>
-              </a:ext>
-            </a:extLst>
-          </p:cNvPr>
-          <p:cNvPicPr>
-            <a:picLocks noChangeAspect="1" noChangeArrowheads="1"/>
-          </p:cNvPicPr>
-          <p:nvPr/>
-        </p:nvPicPr>
-        <p:blipFill>
-          <a:blip r:embed="rId2">
-            <a:extLst>
-              <a:ext uri="{28A0092B-C50C-407E-A947-70E740481C1C}">
-                <a14:useLocalDpi xmlns:a14="http://schemas.microsoft.com/office/drawing/2010/main" val="0"/>
-              </a:ext>
-            </a:extLst>
-          </a:blip>
-          <a:srcRect/>
-          <a:stretch>
-            <a:fillRect/>
-          </a:stretch>
-        </p:blipFill>
-        <p:spPr bwMode="auto">
-          <a:xfrm>
-            <a:off x="338084" y="293520"/>
-            <a:ext cx="11515832" cy="2850733"/>
-          </a:xfrm>
-          <a:prstGeom prst="rect">
-            <a:avLst/>
-          </a:prstGeom>
-          <a:noFill/>
-          <a:ln>
-            <a:noFill/>
-          </a:ln>
-          <a:extLst>
-            <a:ext uri="{909E8E84-426E-40DD-AFC4-6F175D3DCCD1}">
-              <a14:hiddenFill xmlns:a14="http://schemas.microsoft.com/office/drawing/2010/main">
-                <a:solidFill>
-                  <a:srgbClr val="FFFFFF"/>
-                </a:solidFill>
-              </a14:hiddenFill>
-            </a:ext>
-            <a:ext uri="{91240B29-F687-4F45-9708-019B960494DF}">
-              <a14:hiddenLine xmlns:a14="http://schemas.microsoft.com/office/drawing/2010/main" w="9525">
-                <a:solidFill>
-                  <a:srgbClr val="000000"/>
-                </a:solidFill>
-                <a:miter lim="800000"/>
-                <a:headEnd/>
-                <a:tailEnd/>
-              </a14:hiddenLine>
-            </a:ext>
-          </a:extLst>
-        </p:spPr>
-      </p:pic>
       <p:sp>
         <p:nvSpPr>
           <p:cNvPr id="4" name="TextBox 3">
@@ -4613,6 +4564,42 @@
           </a:p>
         </p:txBody>
       </p:sp>
+      <p:pic>
+        <p:nvPicPr>
+          <p:cNvPr id="3" name="Kép 2">
+            <a:extLst>
+              <a:ext uri="{FF2B5EF4-FFF2-40B4-BE49-F238E27FC236}">
+                <a16:creationId xmlns:a16="http://schemas.microsoft.com/office/drawing/2014/main" id="{FD6A1AB8-5D93-4F81-C9AC-7A1C82A37F2A}"/>
+              </a:ext>
+            </a:extLst>
+          </p:cNvPr>
+          <p:cNvPicPr>
+            <a:picLocks noChangeAspect="1"/>
+          </p:cNvPicPr>
+          <p:nvPr/>
+        </p:nvPicPr>
+        <p:blipFill>
+          <a:blip r:embed="rId2">
+            <a:extLst>
+              <a:ext uri="{28A0092B-C50C-407E-A947-70E740481C1C}">
+                <a14:useLocalDpi xmlns:a14="http://schemas.microsoft.com/office/drawing/2010/main" val="0"/>
+              </a:ext>
+            </a:extLst>
+          </a:blip>
+          <a:stretch>
+            <a:fillRect/>
+          </a:stretch>
+        </p:blipFill>
+        <p:spPr>
+          <a:xfrm>
+            <a:off x="0" y="996650"/>
+            <a:ext cx="12192000" cy="1482401"/>
+          </a:xfrm>
+          <a:prstGeom prst="rect">
+            <a:avLst/>
+          </a:prstGeom>
+        </p:spPr>
+      </p:pic>
     </p:spTree>
     <p:extLst>
       <p:ext uri="{BB962C8B-B14F-4D97-AF65-F5344CB8AC3E}">
@@ -4643,66 +4630,6 @@
           <a:chExt cx="0" cy="0"/>
         </a:xfrm>
       </p:grpSpPr>
-      <p:pic>
-        <p:nvPicPr>
-          <p:cNvPr id="3074" name="Picture 2">
-            <a:extLst>
-              <a:ext uri="{FF2B5EF4-FFF2-40B4-BE49-F238E27FC236}">
-                <a16:creationId xmlns:a16="http://schemas.microsoft.com/office/drawing/2014/main" id="{BA2CAA78-4BE7-285E-D10C-8066B7163E4E}"/>
-              </a:ext>
-            </a:extLst>
-          </p:cNvPr>
-          <p:cNvPicPr>
-            <a:picLocks noChangeAspect="1" noChangeArrowheads="1"/>
-          </p:cNvPicPr>
-          <p:nvPr/>
-        </p:nvPicPr>
-        <p:blipFill>
-          <a:blip r:embed="rId2">
-            <a:extLst>
-              <a:ext uri="{28A0092B-C50C-407E-A947-70E740481C1C}">
-                <a14:useLocalDpi xmlns:a14="http://schemas.microsoft.com/office/drawing/2010/main" val="0"/>
-              </a:ext>
-            </a:extLst>
-          </a:blip>
-          <a:srcRect/>
-          <a:stretch>
-            <a:fillRect/>
-          </a:stretch>
-        </p:blipFill>
-        <p:spPr bwMode="auto">
-          <a:xfrm>
-            <a:off x="238147" y="277479"/>
-            <a:ext cx="11715706" cy="2946984"/>
-          </a:xfrm>
-          <a:prstGeom prst="rect">
-            <a:avLst/>
-          </a:prstGeom>
-          <a:noFill/>
-          <a:ln>
-            <a:noFill/>
-          </a:ln>
-          <a:extLst>
-            <a:ext uri="{909E8E84-426E-40DD-AFC4-6F175D3DCCD1}">
-              <a14:hiddenFill xmlns:a14="http://schemas.microsoft.com/office/drawing/2010/main">
-                <a:solidFill>
-                  <a:srgbClr val="FFFFFF"/>
-                </a:solidFill>
-              </a14:hiddenFill>
-            </a:ext>
-            <a:ext uri="{91240B29-F687-4F45-9708-019B960494DF}">
-              <a14:hiddenLine xmlns:a14="http://schemas.microsoft.com/office/drawing/2010/main" w="9525">
-                <a:solidFill>
-                  <a:srgbClr val="000000"/>
-                </a:solidFill>
-                <a:miter lim="800000"/>
-                <a:headEnd/>
-                <a:tailEnd/>
-              </a14:hiddenLine>
-            </a:ext>
-          </a:extLst>
-        </p:spPr>
-      </p:pic>
       <p:sp>
         <p:nvSpPr>
           <p:cNvPr id="4" name="TextBox 3">
@@ -4739,6 +4666,42 @@
           </a:p>
         </p:txBody>
       </p:sp>
+      <p:pic>
+        <p:nvPicPr>
+          <p:cNvPr id="3" name="Kép 2">
+            <a:extLst>
+              <a:ext uri="{FF2B5EF4-FFF2-40B4-BE49-F238E27FC236}">
+                <a16:creationId xmlns:a16="http://schemas.microsoft.com/office/drawing/2014/main" id="{332FC960-8426-A71B-6B7A-FC2D51075C65}"/>
+              </a:ext>
+            </a:extLst>
+          </p:cNvPr>
+          <p:cNvPicPr>
+            <a:picLocks noChangeAspect="1"/>
+          </p:cNvPicPr>
+          <p:nvPr/>
+        </p:nvPicPr>
+        <p:blipFill>
+          <a:blip r:embed="rId2">
+            <a:extLst>
+              <a:ext uri="{28A0092B-C50C-407E-A947-70E740481C1C}">
+                <a14:useLocalDpi xmlns:a14="http://schemas.microsoft.com/office/drawing/2010/main" val="0"/>
+              </a:ext>
+            </a:extLst>
+          </a:blip>
+          <a:stretch>
+            <a:fillRect/>
+          </a:stretch>
+        </p:blipFill>
+        <p:spPr>
+          <a:xfrm>
+            <a:off x="-24075" y="344129"/>
+            <a:ext cx="12216075" cy="2753032"/>
+          </a:xfrm>
+          <a:prstGeom prst="rect">
+            <a:avLst/>
+          </a:prstGeom>
+        </p:spPr>
+      </p:pic>
     </p:spTree>
     <p:extLst>
       <p:ext uri="{BB962C8B-B14F-4D97-AF65-F5344CB8AC3E}">
@@ -4865,36 +4828,6 @@
           <a:chExt cx="0" cy="0"/>
         </a:xfrm>
       </p:grpSpPr>
-      <p:pic>
-        <p:nvPicPr>
-          <p:cNvPr id="5" name="Picture 4">
-            <a:extLst>
-              <a:ext uri="{FF2B5EF4-FFF2-40B4-BE49-F238E27FC236}">
-                <a16:creationId xmlns:a16="http://schemas.microsoft.com/office/drawing/2014/main" id="{58567B41-0493-B393-1A48-2717084F3F18}"/>
-              </a:ext>
-            </a:extLst>
-          </p:cNvPr>
-          <p:cNvPicPr>
-            <a:picLocks noChangeAspect="1"/>
-          </p:cNvPicPr>
-          <p:nvPr/>
-        </p:nvPicPr>
-        <p:blipFill>
-          <a:blip r:embed="rId2"/>
-          <a:stretch>
-            <a:fillRect/>
-          </a:stretch>
-        </p:blipFill>
-        <p:spPr>
-          <a:xfrm>
-            <a:off x="104944" y="81280"/>
-            <a:ext cx="3800345" cy="6695440"/>
-          </a:xfrm>
-          <a:prstGeom prst="rect">
-            <a:avLst/>
-          </a:prstGeom>
-        </p:spPr>
-      </p:pic>
       <p:sp>
         <p:nvSpPr>
           <p:cNvPr id="7" name="TextBox 6">
@@ -4988,6 +4921,42 @@
           </a:p>
         </p:txBody>
       </p:sp>
+      <p:pic>
+        <p:nvPicPr>
+          <p:cNvPr id="3" name="Kép 2">
+            <a:extLst>
+              <a:ext uri="{FF2B5EF4-FFF2-40B4-BE49-F238E27FC236}">
+                <a16:creationId xmlns:a16="http://schemas.microsoft.com/office/drawing/2014/main" id="{4258A5B6-F006-913D-855C-2B29225DDBA4}"/>
+              </a:ext>
+            </a:extLst>
+          </p:cNvPr>
+          <p:cNvPicPr>
+            <a:picLocks noChangeAspect="1"/>
+          </p:cNvPicPr>
+          <p:nvPr/>
+        </p:nvPicPr>
+        <p:blipFill>
+          <a:blip r:embed="rId2">
+            <a:extLst>
+              <a:ext uri="{28A0092B-C50C-407E-A947-70E740481C1C}">
+                <a14:useLocalDpi xmlns:a14="http://schemas.microsoft.com/office/drawing/2010/main" val="0"/>
+              </a:ext>
+            </a:extLst>
+          </a:blip>
+          <a:stretch>
+            <a:fillRect/>
+          </a:stretch>
+        </p:blipFill>
+        <p:spPr>
+          <a:xfrm>
+            <a:off x="0" y="-1"/>
+            <a:ext cx="3839810" cy="6858001"/>
+          </a:xfrm>
+          <a:prstGeom prst="rect">
+            <a:avLst/>
+          </a:prstGeom>
+        </p:spPr>
+      </p:pic>
     </p:spTree>
     <p:extLst>
       <p:ext uri="{BB962C8B-B14F-4D97-AF65-F5344CB8AC3E}">

</xml_diff>